<commit_message>
Add The New Presentation (2)
</commit_message>
<xml_diff>
--- a/Hot Deals Platform.pptx
+++ b/Hot Deals Platform.pptx
@@ -3346,7 +3346,7 @@
       </p:grpSpPr>
       <p:sp>
         <p:nvSpPr>
-          <p:cNvPr id="8" name="Rectangle 7">
+          <p:cNvPr id="31" name="Rectangle 30">
             <a:extLst>
               <a:ext uri="{FF2B5EF4-FFF2-40B4-BE49-F238E27FC236}">
                 <a16:creationId xmlns:a16="http://schemas.microsoft.com/office/drawing/2014/main" id="{5E7AA7E8-8006-4E1F-A566-FCF37EE6F35D}"/>
@@ -3490,7 +3490,7 @@
           <a:p>
             <a:pPr algn="l"/>
             <a:r>
-              <a:rPr lang="en-US" sz="3100">
+              <a:rPr lang="en-US" sz="4400">
                 <a:solidFill>
                   <a:srgbClr val="FFFFFF"/>
                 </a:solidFill>
@@ -3501,7 +3501,7 @@
           <a:p>
             <a:pPr algn="l"/>
             <a:r>
-              <a:rPr lang="en-US" sz="3100">
+              <a:rPr lang="en-US" sz="4400">
                 <a:solidFill>
                   <a:srgbClr val="FFFFFF"/>
                 </a:solidFill>
@@ -3511,61 +3511,17 @@
           </a:p>
           <a:p>
             <a:pPr algn="l"/>
-            <a:endParaRPr lang="ar-EG" sz="3100">
+            <a:endParaRPr lang="ar-EG" sz="4400">
               <a:solidFill>
                 <a:srgbClr val="FFFFFF"/>
               </a:solidFill>
             </a:endParaRPr>
           </a:p>
-          <a:p>
-            <a:pPr algn="l"/>
-            <a:r>
-              <a:rPr lang="en-US" sz="3100">
-                <a:solidFill>
-                  <a:srgbClr val="FFFFFF"/>
-                </a:solidFill>
-              </a:rPr>
-              <a:t>Youssef Atef: Leader / Frontend</a:t>
-            </a:r>
-          </a:p>
-          <a:p>
-            <a:pPr algn="l"/>
-            <a:r>
-              <a:rPr lang="en-US" sz="3100">
-                <a:solidFill>
-                  <a:srgbClr val="FFFFFF"/>
-                </a:solidFill>
-              </a:rPr>
-              <a:t>Philopater Wael: Frontend / Backend</a:t>
-            </a:r>
-          </a:p>
-          <a:p>
-            <a:pPr algn="l"/>
-            <a:r>
-              <a:rPr lang="en-US" sz="3100">
-                <a:solidFill>
-                  <a:srgbClr val="FFFFFF"/>
-                </a:solidFill>
-              </a:rPr>
-              <a:t>Youssef Waleed: Frontend</a:t>
-            </a:r>
-          </a:p>
-          <a:p>
-            <a:pPr algn="l"/>
-            <a:r>
-              <a:rPr lang="en-US" sz="3100">
-                <a:solidFill>
-                  <a:srgbClr val="FFFFFF"/>
-                </a:solidFill>
-              </a:rPr>
-              <a:t>Ahmed Sobhy: Frontend</a:t>
-            </a:r>
-          </a:p>
         </p:txBody>
       </p:sp>
       <p:cxnSp>
         <p:nvCxnSpPr>
-          <p:cNvPr id="10" name="Straight Connector 9">
+          <p:cNvPr id="32" name="Straight Connector 31">
             <a:extLst>
               <a:ext uri="{FF2B5EF4-FFF2-40B4-BE49-F238E27FC236}">
                 <a16:creationId xmlns:a16="http://schemas.microsoft.com/office/drawing/2014/main" id="{56020367-4FD5-4596-8E10-C5F095CD8DBF}"/>
@@ -3876,466 +3832,6 @@
                       </p:childTnLst>
                     </p:cTn>
                   </p:par>
-                  <p:par>
-                    <p:cTn id="17" fill="hold">
-                      <p:stCondLst>
-                        <p:cond delay="indefinite"/>
-                      </p:stCondLst>
-                      <p:childTnLst>
-                        <p:par>
-                          <p:cTn id="18" fill="hold">
-                            <p:stCondLst>
-                              <p:cond delay="0"/>
-                            </p:stCondLst>
-                            <p:childTnLst>
-                              <p:par>
-                                <p:cTn id="19" presetID="53" presetClass="entr" presetSubtype="16" fill="hold" grpId="0" nodeType="clickEffect">
-                                  <p:stCondLst>
-                                    <p:cond delay="0"/>
-                                  </p:stCondLst>
-                                  <p:childTnLst>
-                                    <p:set>
-                                      <p:cBhvr>
-                                        <p:cTn id="20" dur="1" fill="hold">
-                                          <p:stCondLst>
-                                            <p:cond delay="0"/>
-                                          </p:stCondLst>
-                                        </p:cTn>
-                                        <p:tgtEl>
-                                          <p:spTgt spid="3">
-                                            <p:txEl>
-                                              <p:pRg st="3" end="3"/>
-                                            </p:txEl>
-                                          </p:spTgt>
-                                        </p:tgtEl>
-                                        <p:attrNameLst>
-                                          <p:attrName>style.visibility</p:attrName>
-                                        </p:attrNameLst>
-                                      </p:cBhvr>
-                                      <p:to>
-                                        <p:strVal val="visible"/>
-                                      </p:to>
-                                    </p:set>
-                                    <p:anim calcmode="lin" valueType="num">
-                                      <p:cBhvr>
-                                        <p:cTn id="21" dur="500" fill="hold"/>
-                                        <p:tgtEl>
-                                          <p:spTgt spid="3">
-                                            <p:txEl>
-                                              <p:pRg st="3" end="3"/>
-                                            </p:txEl>
-                                          </p:spTgt>
-                                        </p:tgtEl>
-                                        <p:attrNameLst>
-                                          <p:attrName>ppt_w</p:attrName>
-                                        </p:attrNameLst>
-                                      </p:cBhvr>
-                                      <p:tavLst>
-                                        <p:tav tm="0">
-                                          <p:val>
-                                            <p:fltVal val="0"/>
-                                          </p:val>
-                                        </p:tav>
-                                        <p:tav tm="100000">
-                                          <p:val>
-                                            <p:strVal val="#ppt_w"/>
-                                          </p:val>
-                                        </p:tav>
-                                      </p:tavLst>
-                                    </p:anim>
-                                    <p:anim calcmode="lin" valueType="num">
-                                      <p:cBhvr>
-                                        <p:cTn id="22" dur="500" fill="hold"/>
-                                        <p:tgtEl>
-                                          <p:spTgt spid="3">
-                                            <p:txEl>
-                                              <p:pRg st="3" end="3"/>
-                                            </p:txEl>
-                                          </p:spTgt>
-                                        </p:tgtEl>
-                                        <p:attrNameLst>
-                                          <p:attrName>ppt_h</p:attrName>
-                                        </p:attrNameLst>
-                                      </p:cBhvr>
-                                      <p:tavLst>
-                                        <p:tav tm="0">
-                                          <p:val>
-                                            <p:fltVal val="0"/>
-                                          </p:val>
-                                        </p:tav>
-                                        <p:tav tm="100000">
-                                          <p:val>
-                                            <p:strVal val="#ppt_h"/>
-                                          </p:val>
-                                        </p:tav>
-                                      </p:tavLst>
-                                    </p:anim>
-                                    <p:animEffect transition="in" filter="fade">
-                                      <p:cBhvr>
-                                        <p:cTn id="23" dur="500"/>
-                                        <p:tgtEl>
-                                          <p:spTgt spid="3">
-                                            <p:txEl>
-                                              <p:pRg st="3" end="3"/>
-                                            </p:txEl>
-                                          </p:spTgt>
-                                        </p:tgtEl>
-                                      </p:cBhvr>
-                                    </p:animEffect>
-                                  </p:childTnLst>
-                                </p:cTn>
-                              </p:par>
-                            </p:childTnLst>
-                          </p:cTn>
-                        </p:par>
-                      </p:childTnLst>
-                    </p:cTn>
-                  </p:par>
-                  <p:par>
-                    <p:cTn id="24" fill="hold">
-                      <p:stCondLst>
-                        <p:cond delay="indefinite"/>
-                      </p:stCondLst>
-                      <p:childTnLst>
-                        <p:par>
-                          <p:cTn id="25" fill="hold">
-                            <p:stCondLst>
-                              <p:cond delay="0"/>
-                            </p:stCondLst>
-                            <p:childTnLst>
-                              <p:par>
-                                <p:cTn id="26" presetID="53" presetClass="entr" presetSubtype="16" fill="hold" grpId="0" nodeType="clickEffect">
-                                  <p:stCondLst>
-                                    <p:cond delay="0"/>
-                                  </p:stCondLst>
-                                  <p:childTnLst>
-                                    <p:set>
-                                      <p:cBhvr>
-                                        <p:cTn id="27" dur="1" fill="hold">
-                                          <p:stCondLst>
-                                            <p:cond delay="0"/>
-                                          </p:stCondLst>
-                                        </p:cTn>
-                                        <p:tgtEl>
-                                          <p:spTgt spid="3">
-                                            <p:txEl>
-                                              <p:pRg st="4" end="4"/>
-                                            </p:txEl>
-                                          </p:spTgt>
-                                        </p:tgtEl>
-                                        <p:attrNameLst>
-                                          <p:attrName>style.visibility</p:attrName>
-                                        </p:attrNameLst>
-                                      </p:cBhvr>
-                                      <p:to>
-                                        <p:strVal val="visible"/>
-                                      </p:to>
-                                    </p:set>
-                                    <p:anim calcmode="lin" valueType="num">
-                                      <p:cBhvr>
-                                        <p:cTn id="28" dur="500" fill="hold"/>
-                                        <p:tgtEl>
-                                          <p:spTgt spid="3">
-                                            <p:txEl>
-                                              <p:pRg st="4" end="4"/>
-                                            </p:txEl>
-                                          </p:spTgt>
-                                        </p:tgtEl>
-                                        <p:attrNameLst>
-                                          <p:attrName>ppt_w</p:attrName>
-                                        </p:attrNameLst>
-                                      </p:cBhvr>
-                                      <p:tavLst>
-                                        <p:tav tm="0">
-                                          <p:val>
-                                            <p:fltVal val="0"/>
-                                          </p:val>
-                                        </p:tav>
-                                        <p:tav tm="100000">
-                                          <p:val>
-                                            <p:strVal val="#ppt_w"/>
-                                          </p:val>
-                                        </p:tav>
-                                      </p:tavLst>
-                                    </p:anim>
-                                    <p:anim calcmode="lin" valueType="num">
-                                      <p:cBhvr>
-                                        <p:cTn id="29" dur="500" fill="hold"/>
-                                        <p:tgtEl>
-                                          <p:spTgt spid="3">
-                                            <p:txEl>
-                                              <p:pRg st="4" end="4"/>
-                                            </p:txEl>
-                                          </p:spTgt>
-                                        </p:tgtEl>
-                                        <p:attrNameLst>
-                                          <p:attrName>ppt_h</p:attrName>
-                                        </p:attrNameLst>
-                                      </p:cBhvr>
-                                      <p:tavLst>
-                                        <p:tav tm="0">
-                                          <p:val>
-                                            <p:fltVal val="0"/>
-                                          </p:val>
-                                        </p:tav>
-                                        <p:tav tm="100000">
-                                          <p:val>
-                                            <p:strVal val="#ppt_h"/>
-                                          </p:val>
-                                        </p:tav>
-                                      </p:tavLst>
-                                    </p:anim>
-                                    <p:animEffect transition="in" filter="fade">
-                                      <p:cBhvr>
-                                        <p:cTn id="30" dur="500"/>
-                                        <p:tgtEl>
-                                          <p:spTgt spid="3">
-                                            <p:txEl>
-                                              <p:pRg st="4" end="4"/>
-                                            </p:txEl>
-                                          </p:spTgt>
-                                        </p:tgtEl>
-                                      </p:cBhvr>
-                                    </p:animEffect>
-                                  </p:childTnLst>
-                                </p:cTn>
-                              </p:par>
-                            </p:childTnLst>
-                          </p:cTn>
-                        </p:par>
-                      </p:childTnLst>
-                    </p:cTn>
-                  </p:par>
-                  <p:par>
-                    <p:cTn id="31" fill="hold">
-                      <p:stCondLst>
-                        <p:cond delay="indefinite"/>
-                      </p:stCondLst>
-                      <p:childTnLst>
-                        <p:par>
-                          <p:cTn id="32" fill="hold">
-                            <p:stCondLst>
-                              <p:cond delay="0"/>
-                            </p:stCondLst>
-                            <p:childTnLst>
-                              <p:par>
-                                <p:cTn id="33" presetID="53" presetClass="entr" presetSubtype="16" fill="hold" grpId="0" nodeType="clickEffect">
-                                  <p:stCondLst>
-                                    <p:cond delay="0"/>
-                                  </p:stCondLst>
-                                  <p:childTnLst>
-                                    <p:set>
-                                      <p:cBhvr>
-                                        <p:cTn id="34" dur="1" fill="hold">
-                                          <p:stCondLst>
-                                            <p:cond delay="0"/>
-                                          </p:stCondLst>
-                                        </p:cTn>
-                                        <p:tgtEl>
-                                          <p:spTgt spid="3">
-                                            <p:txEl>
-                                              <p:pRg st="5" end="5"/>
-                                            </p:txEl>
-                                          </p:spTgt>
-                                        </p:tgtEl>
-                                        <p:attrNameLst>
-                                          <p:attrName>style.visibility</p:attrName>
-                                        </p:attrNameLst>
-                                      </p:cBhvr>
-                                      <p:to>
-                                        <p:strVal val="visible"/>
-                                      </p:to>
-                                    </p:set>
-                                    <p:anim calcmode="lin" valueType="num">
-                                      <p:cBhvr>
-                                        <p:cTn id="35" dur="500" fill="hold"/>
-                                        <p:tgtEl>
-                                          <p:spTgt spid="3">
-                                            <p:txEl>
-                                              <p:pRg st="5" end="5"/>
-                                            </p:txEl>
-                                          </p:spTgt>
-                                        </p:tgtEl>
-                                        <p:attrNameLst>
-                                          <p:attrName>ppt_w</p:attrName>
-                                        </p:attrNameLst>
-                                      </p:cBhvr>
-                                      <p:tavLst>
-                                        <p:tav tm="0">
-                                          <p:val>
-                                            <p:fltVal val="0"/>
-                                          </p:val>
-                                        </p:tav>
-                                        <p:tav tm="100000">
-                                          <p:val>
-                                            <p:strVal val="#ppt_w"/>
-                                          </p:val>
-                                        </p:tav>
-                                      </p:tavLst>
-                                    </p:anim>
-                                    <p:anim calcmode="lin" valueType="num">
-                                      <p:cBhvr>
-                                        <p:cTn id="36" dur="500" fill="hold"/>
-                                        <p:tgtEl>
-                                          <p:spTgt spid="3">
-                                            <p:txEl>
-                                              <p:pRg st="5" end="5"/>
-                                            </p:txEl>
-                                          </p:spTgt>
-                                        </p:tgtEl>
-                                        <p:attrNameLst>
-                                          <p:attrName>ppt_h</p:attrName>
-                                        </p:attrNameLst>
-                                      </p:cBhvr>
-                                      <p:tavLst>
-                                        <p:tav tm="0">
-                                          <p:val>
-                                            <p:fltVal val="0"/>
-                                          </p:val>
-                                        </p:tav>
-                                        <p:tav tm="100000">
-                                          <p:val>
-                                            <p:strVal val="#ppt_h"/>
-                                          </p:val>
-                                        </p:tav>
-                                      </p:tavLst>
-                                    </p:anim>
-                                    <p:animEffect transition="in" filter="fade">
-                                      <p:cBhvr>
-                                        <p:cTn id="37" dur="500"/>
-                                        <p:tgtEl>
-                                          <p:spTgt spid="3">
-                                            <p:txEl>
-                                              <p:pRg st="5" end="5"/>
-                                            </p:txEl>
-                                          </p:spTgt>
-                                        </p:tgtEl>
-                                      </p:cBhvr>
-                                    </p:animEffect>
-                                  </p:childTnLst>
-                                </p:cTn>
-                              </p:par>
-                            </p:childTnLst>
-                          </p:cTn>
-                        </p:par>
-                      </p:childTnLst>
-                    </p:cTn>
-                  </p:par>
-                  <p:par>
-                    <p:cTn id="38" fill="hold">
-                      <p:stCondLst>
-                        <p:cond delay="indefinite"/>
-                      </p:stCondLst>
-                      <p:childTnLst>
-                        <p:par>
-                          <p:cTn id="39" fill="hold">
-                            <p:stCondLst>
-                              <p:cond delay="0"/>
-                            </p:stCondLst>
-                            <p:childTnLst>
-                              <p:par>
-                                <p:cTn id="40" presetID="53" presetClass="entr" presetSubtype="16" fill="hold" grpId="0" nodeType="clickEffect">
-                                  <p:stCondLst>
-                                    <p:cond delay="0"/>
-                                  </p:stCondLst>
-                                  <p:childTnLst>
-                                    <p:set>
-                                      <p:cBhvr>
-                                        <p:cTn id="41" dur="1" fill="hold">
-                                          <p:stCondLst>
-                                            <p:cond delay="0"/>
-                                          </p:stCondLst>
-                                        </p:cTn>
-                                        <p:tgtEl>
-                                          <p:spTgt spid="3">
-                                            <p:txEl>
-                                              <p:pRg st="6" end="6"/>
-                                            </p:txEl>
-                                          </p:spTgt>
-                                        </p:tgtEl>
-                                        <p:attrNameLst>
-                                          <p:attrName>style.visibility</p:attrName>
-                                        </p:attrNameLst>
-                                      </p:cBhvr>
-                                      <p:to>
-                                        <p:strVal val="visible"/>
-                                      </p:to>
-                                    </p:set>
-                                    <p:anim calcmode="lin" valueType="num">
-                                      <p:cBhvr>
-                                        <p:cTn id="42" dur="500" fill="hold"/>
-                                        <p:tgtEl>
-                                          <p:spTgt spid="3">
-                                            <p:txEl>
-                                              <p:pRg st="6" end="6"/>
-                                            </p:txEl>
-                                          </p:spTgt>
-                                        </p:tgtEl>
-                                        <p:attrNameLst>
-                                          <p:attrName>ppt_w</p:attrName>
-                                        </p:attrNameLst>
-                                      </p:cBhvr>
-                                      <p:tavLst>
-                                        <p:tav tm="0">
-                                          <p:val>
-                                            <p:fltVal val="0"/>
-                                          </p:val>
-                                        </p:tav>
-                                        <p:tav tm="100000">
-                                          <p:val>
-                                            <p:strVal val="#ppt_w"/>
-                                          </p:val>
-                                        </p:tav>
-                                      </p:tavLst>
-                                    </p:anim>
-                                    <p:anim calcmode="lin" valueType="num">
-                                      <p:cBhvr>
-                                        <p:cTn id="43" dur="500" fill="hold"/>
-                                        <p:tgtEl>
-                                          <p:spTgt spid="3">
-                                            <p:txEl>
-                                              <p:pRg st="6" end="6"/>
-                                            </p:txEl>
-                                          </p:spTgt>
-                                        </p:tgtEl>
-                                        <p:attrNameLst>
-                                          <p:attrName>ppt_h</p:attrName>
-                                        </p:attrNameLst>
-                                      </p:cBhvr>
-                                      <p:tavLst>
-                                        <p:tav tm="0">
-                                          <p:val>
-                                            <p:fltVal val="0"/>
-                                          </p:val>
-                                        </p:tav>
-                                        <p:tav tm="100000">
-                                          <p:val>
-                                            <p:strVal val="#ppt_h"/>
-                                          </p:val>
-                                        </p:tav>
-                                      </p:tavLst>
-                                    </p:anim>
-                                    <p:animEffect transition="in" filter="fade">
-                                      <p:cBhvr>
-                                        <p:cTn id="44" dur="500"/>
-                                        <p:tgtEl>
-                                          <p:spTgt spid="3">
-                                            <p:txEl>
-                                              <p:pRg st="6" end="6"/>
-                                            </p:txEl>
-                                          </p:spTgt>
-                                        </p:tgtEl>
-                                      </p:cBhvr>
-                                    </p:animEffect>
-                                  </p:childTnLst>
-                                </p:cTn>
-                              </p:par>
-                            </p:childTnLst>
-                          </p:cTn>
-                        </p:par>
-                      </p:childTnLst>
-                    </p:cTn>
-                  </p:par>
                 </p:childTnLst>
               </p:cTn>
               <p:prevCondLst>
@@ -4841,13 +4337,13 @@
   <p:clrMapOvr>
     <a:masterClrMapping/>
   </p:clrMapOvr>
-  <mc:AlternateContent xmlns:mc="http://schemas.openxmlformats.org/markup-compatibility/2006">
-    <mc:Choice xmlns:p159="http://schemas.microsoft.com/office/powerpoint/2015/09/main" Requires="p159">
+  <mc:AlternateContent xmlns:mc="http://schemas.openxmlformats.org/markup-compatibility/2006" xmlns:p159="http://schemas.microsoft.com/office/powerpoint/2015/09/main">
+    <mc:Choice Requires="p159">
       <p:transition xmlns:p14="http://schemas.microsoft.com/office/powerpoint/2010/main" spd="slow" p14:dur="2000">
         <p159:morph option="byObject"/>
       </p:transition>
     </mc:Choice>
-    <mc:Fallback>
+    <mc:Fallback xmlns="">
       <p:transition spd="slow">
         <p:fade/>
       </p:transition>
@@ -7737,13 +7233,13 @@
   <p:clrMapOvr>
     <a:masterClrMapping/>
   </p:clrMapOvr>
-  <mc:AlternateContent xmlns:mc="http://schemas.openxmlformats.org/markup-compatibility/2006">
-    <mc:Choice xmlns:p159="http://schemas.microsoft.com/office/powerpoint/2015/09/main" Requires="p159">
+  <mc:AlternateContent xmlns:mc="http://schemas.openxmlformats.org/markup-compatibility/2006" xmlns:p159="http://schemas.microsoft.com/office/powerpoint/2015/09/main">
+    <mc:Choice Requires="p159">
       <p:transition xmlns:p14="http://schemas.microsoft.com/office/powerpoint/2010/main" spd="slow" p14:dur="2000">
         <p159:morph option="byObject"/>
       </p:transition>
     </mc:Choice>
-    <mc:Fallback>
+    <mc:Fallback xmlns="">
       <p:transition spd="slow">
         <p:fade/>
       </p:transition>
@@ -8501,13 +7997,13 @@
   <p:clrMapOvr>
     <a:masterClrMapping/>
   </p:clrMapOvr>
-  <mc:AlternateContent xmlns:mc="http://schemas.openxmlformats.org/markup-compatibility/2006">
-    <mc:Choice xmlns:p159="http://schemas.microsoft.com/office/powerpoint/2015/09/main" Requires="p159">
+  <mc:AlternateContent xmlns:mc="http://schemas.openxmlformats.org/markup-compatibility/2006" xmlns:p159="http://schemas.microsoft.com/office/powerpoint/2015/09/main">
+    <mc:Choice Requires="p159">
       <p:transition xmlns:p14="http://schemas.microsoft.com/office/powerpoint/2010/main" spd="slow" p14:dur="2000">
         <p159:morph option="byObject"/>
       </p:transition>
     </mc:Choice>
-    <mc:Fallback>
+    <mc:Fallback xmlns="">
       <p:transition spd="slow">
         <p:fade/>
       </p:transition>
@@ -12201,13 +11697,13 @@
   <p:clrMapOvr>
     <a:masterClrMapping/>
   </p:clrMapOvr>
-  <mc:AlternateContent xmlns:mc="http://schemas.openxmlformats.org/markup-compatibility/2006">
-    <mc:Choice xmlns:p159="http://schemas.microsoft.com/office/powerpoint/2015/09/main" Requires="p159">
+  <mc:AlternateContent xmlns:mc="http://schemas.openxmlformats.org/markup-compatibility/2006" xmlns:p159="http://schemas.microsoft.com/office/powerpoint/2015/09/main">
+    <mc:Choice Requires="p159">
       <p:transition xmlns:p14="http://schemas.microsoft.com/office/powerpoint/2010/main" spd="slow" p14:dur="2000">
         <p159:morph option="byObject"/>
       </p:transition>
     </mc:Choice>
-    <mc:Fallback>
+    <mc:Fallback xmlns="">
       <p:transition spd="slow">
         <p:fade/>
       </p:transition>

</xml_diff>

<commit_message>
Fix name in presentation
</commit_message>
<xml_diff>
--- a/Hot Deals Platform.pptx
+++ b/Hot Deals Platform.pptx
@@ -7187,39 +7187,39 @@
           <a:lstStyle/>
           <a:p>
             <a:r>
-              <a:rPr lang="en-US" sz="2400"/>
+              <a:rPr lang="en-US" sz="2400" dirty="0"/>
               <a:t>Youssef Atef: Team Leader &amp; Frontend Developer.</a:t>
             </a:r>
           </a:p>
           <a:p>
-            <a:endParaRPr lang="en-US" sz="2400"/>
+            <a:endParaRPr lang="en-US" sz="2400" dirty="0"/>
           </a:p>
           <a:p>
             <a:r>
               <a:rPr lang="en-US" sz="2400"/>
-              <a:t>Philopater Wael: Frontend &amp; Backend Developer</a:t>
+              <a:t>Philopateer Wael: Frontend &amp; Backend Developer</a:t>
             </a:r>
           </a:p>
           <a:p>
-            <a:endParaRPr lang="en-US" sz="2400"/>
+            <a:endParaRPr lang="en-US" sz="2400" dirty="0"/>
           </a:p>
           <a:p>
             <a:r>
-              <a:rPr lang="en-US" sz="2400"/>
+              <a:rPr lang="en-US" sz="2400" dirty="0"/>
               <a:t>Youssef Waleer: Frontend developer</a:t>
             </a:r>
           </a:p>
           <a:p>
-            <a:endParaRPr lang="en-US" sz="2400"/>
+            <a:endParaRPr lang="en-US" sz="2400" dirty="0"/>
           </a:p>
           <a:p>
             <a:r>
-              <a:rPr lang="en-US" sz="2400"/>
+              <a:rPr lang="en-US" sz="2400" dirty="0"/>
               <a:t>Ahmed Sobhy: Frontend developer</a:t>
             </a:r>
           </a:p>
           <a:p>
-            <a:endParaRPr lang="en-US" sz="2400"/>
+            <a:endParaRPr lang="en-US" sz="2400" dirty="0"/>
           </a:p>
         </p:txBody>
       </p:sp>

</xml_diff>